<commit_message>
- reduced text in some of the slides - updated call flows
</commit_message>
<xml_diff>
--- a/presentations/slides-112-BRSKI-AE_BRSKI-PRM.pptx
+++ b/presentations/slides-112-BRSKI-AE_BRSKI-PRM.pptx
@@ -232,7 +232,7 @@
           <a:p>
             <a:fld id="{33B5B5E8-CA78-4A82-83A0-867EF5A818AE}" type="datetimeFigureOut">
               <a:rPr lang="en-US" smtClean="0"/>
-              <a:t>11/2/2021</a:t>
+              <a:t>11/3/2021</a:t>
             </a:fld>
             <a:endParaRPr lang="en-US"/>
           </a:p>
@@ -1410,7 +1410,7 @@
           <a:p>
             <a:fld id="{8C792E63-5F21-4F54-A864-D84D9F273FCA}" type="datetimeFigureOut">
               <a:rPr lang="en-US" smtClean="0"/>
-              <a:t>11/2/2021</a:t>
+              <a:t>11/3/2021</a:t>
             </a:fld>
             <a:endParaRPr lang="en-US" dirty="0"/>
           </a:p>
@@ -1628,7 +1628,7 @@
           <a:p>
             <a:fld id="{8C792E63-5F21-4F54-A864-D84D9F273FCA}" type="datetimeFigureOut">
               <a:rPr lang="en-US" smtClean="0"/>
-              <a:t>11/2/2021</a:t>
+              <a:t>11/3/2021</a:t>
             </a:fld>
             <a:endParaRPr lang="en-US"/>
           </a:p>
@@ -1852,7 +1852,7 @@
           <a:p>
             <a:fld id="{8C792E63-5F21-4F54-A864-D84D9F273FCA}" type="datetimeFigureOut">
               <a:rPr lang="en-US" smtClean="0"/>
-              <a:t>11/2/2021</a:t>
+              <a:t>11/3/2021</a:t>
             </a:fld>
             <a:endParaRPr lang="en-US"/>
           </a:p>
@@ -2066,7 +2066,7 @@
           <a:p>
             <a:fld id="{8C792E63-5F21-4F54-A864-D84D9F273FCA}" type="datetimeFigureOut">
               <a:rPr lang="en-US" smtClean="0"/>
-              <a:t>11/2/2021</a:t>
+              <a:t>11/3/2021</a:t>
             </a:fld>
             <a:endParaRPr lang="en-US"/>
           </a:p>
@@ -2357,7 +2357,7 @@
           <a:p>
             <a:fld id="{8C792E63-5F21-4F54-A864-D84D9F273FCA}" type="datetimeFigureOut">
               <a:rPr lang="en-US" smtClean="0"/>
-              <a:t>11/2/2021</a:t>
+              <a:t>11/3/2021</a:t>
             </a:fld>
             <a:endParaRPr lang="en-US"/>
           </a:p>
@@ -2638,7 +2638,7 @@
           <a:p>
             <a:fld id="{8C792E63-5F21-4F54-A864-D84D9F273FCA}" type="datetimeFigureOut">
               <a:rPr lang="en-US" smtClean="0"/>
-              <a:t>11/2/2021</a:t>
+              <a:t>11/3/2021</a:t>
             </a:fld>
             <a:endParaRPr lang="en-US"/>
           </a:p>
@@ -3066,7 +3066,7 @@
           <a:p>
             <a:fld id="{8C792E63-5F21-4F54-A864-D84D9F273FCA}" type="datetimeFigureOut">
               <a:rPr lang="en-US" smtClean="0"/>
-              <a:t>11/2/2021</a:t>
+              <a:t>11/3/2021</a:t>
             </a:fld>
             <a:endParaRPr lang="en-US"/>
           </a:p>
@@ -3223,7 +3223,7 @@
           <a:p>
             <a:fld id="{8C792E63-5F21-4F54-A864-D84D9F273FCA}" type="datetimeFigureOut">
               <a:rPr lang="en-US" smtClean="0"/>
-              <a:t>11/2/2021</a:t>
+              <a:t>11/3/2021</a:t>
             </a:fld>
             <a:endParaRPr lang="en-US"/>
           </a:p>
@@ -3352,7 +3352,7 @@
           <a:p>
             <a:fld id="{8C792E63-5F21-4F54-A864-D84D9F273FCA}" type="datetimeFigureOut">
               <a:rPr lang="en-US" smtClean="0"/>
-              <a:t>11/2/2021</a:t>
+              <a:t>11/3/2021</a:t>
             </a:fld>
             <a:endParaRPr lang="en-US"/>
           </a:p>
@@ -3679,7 +3679,7 @@
           <a:p>
             <a:fld id="{8C792E63-5F21-4F54-A864-D84D9F273FCA}" type="datetimeFigureOut">
               <a:rPr lang="en-US" smtClean="0"/>
-              <a:t>11/2/2021</a:t>
+              <a:t>11/3/2021</a:t>
             </a:fld>
             <a:endParaRPr lang="en-US"/>
           </a:p>
@@ -3983,7 +3983,7 @@
           <a:p>
             <a:fld id="{8C792E63-5F21-4F54-A864-D84D9F273FCA}" type="datetimeFigureOut">
               <a:rPr lang="en-US" smtClean="0"/>
-              <a:t>11/2/2021</a:t>
+              <a:t>11/3/2021</a:t>
             </a:fld>
             <a:endParaRPr lang="en-US"/>
           </a:p>
@@ -4275,7 +4275,7 @@
           <a:p>
             <a:fld id="{8C792E63-5F21-4F54-A864-D84D9F273FCA}" type="datetimeFigureOut">
               <a:rPr lang="en-US" smtClean="0"/>
-              <a:t>11/2/2021</a:t>
+              <a:t>11/3/2021</a:t>
             </a:fld>
             <a:endParaRPr lang="en-US"/>
           </a:p>
@@ -8387,7 +8387,15 @@
             </a:pPr>
             <a:r>
               <a:rPr lang="en-US" sz="2200" dirty="0"/>
-              <a:t>Discussion in ANIMA Design Team and on the mailing list to split the draft along the two use cases</a:t>
+              <a:t>Discussion (ANIMA Design </a:t>
+            </a:r>
+            <a:r>
+              <a:rPr lang="en-US" sz="2200" dirty="0" err="1"/>
+              <a:t>Teamm</a:t>
+            </a:r>
+            <a:r>
+              <a:rPr lang="en-US" sz="2200" dirty="0"/>
+              <a:t>, mailing list) to split the draft along the two use cases</a:t>
             </a:r>
           </a:p>
           <a:p>
@@ -8419,123 +8427,6 @@
             <a:r>
               <a:rPr lang="en-US" sz="2200" dirty="0"/>
               <a:t>UC2 became "BRSKI with Pledge in Responder Mode (BRSKI- PRM)", and addresses the communication between the pledge and the registrar by reversing the initiator and responder role (compared to RFC 8995) introducing a registrar-agent component to facilitate the communication. </a:t>
-            </a:r>
-          </a:p>
-          <a:p>
-            <a:pPr>
-              <a:lnSpc>
-                <a:spcPct val="100000"/>
-              </a:lnSpc>
-              <a:spcBef>
-                <a:spcPts val="0"/>
-              </a:spcBef>
-              <a:spcAft>
-                <a:spcPts val="1000"/>
-              </a:spcAft>
-            </a:pPr>
-            <a:endParaRPr lang="en-US" sz="2200" dirty="0"/>
-          </a:p>
-          <a:p>
-            <a:pPr>
-              <a:lnSpc>
-                <a:spcPct val="100000"/>
-              </a:lnSpc>
-              <a:spcBef>
-                <a:spcPts val="0"/>
-              </a:spcBef>
-              <a:spcAft>
-                <a:spcPts val="1000"/>
-              </a:spcAft>
-            </a:pPr>
-            <a:endParaRPr lang="en-US" sz="2200" dirty="0"/>
-          </a:p>
-          <a:p>
-            <a:pPr>
-              <a:lnSpc>
-                <a:spcPct val="100000"/>
-              </a:lnSpc>
-              <a:spcBef>
-                <a:spcPts val="0"/>
-              </a:spcBef>
-              <a:spcAft>
-                <a:spcPts val="1000"/>
-              </a:spcAft>
-            </a:pPr>
-            <a:endParaRPr lang="en-US" sz="2200" dirty="0"/>
-          </a:p>
-          <a:p>
-            <a:pPr>
-              <a:lnSpc>
-                <a:spcPct val="100000"/>
-              </a:lnSpc>
-              <a:spcBef>
-                <a:spcPts val="0"/>
-              </a:spcBef>
-              <a:spcAft>
-                <a:spcPts val="1000"/>
-              </a:spcAft>
-            </a:pPr>
-            <a:r>
-              <a:rPr lang="en-US" sz="2200" dirty="0"/>
-              <a:t>Distinction between operational modes of the pledge </a:t>
-            </a:r>
-          </a:p>
-          <a:p>
-            <a:pPr lvl="1">
-              <a:lnSpc>
-                <a:spcPct val="100000"/>
-              </a:lnSpc>
-              <a:spcBef>
-                <a:spcPts val="0"/>
-              </a:spcBef>
-              <a:spcAft>
-                <a:spcPts val="1000"/>
-              </a:spcAft>
-            </a:pPr>
-            <a:r>
-              <a:rPr lang="en-US" sz="2200" dirty="0"/>
-              <a:t>Pledge-initiator-mode (use case 1): Pledge acts as client and follows the BRSKI approach for the voucher exchange, but allows for alternative enrollment protocols</a:t>
-            </a:r>
-          </a:p>
-          <a:p>
-            <a:pPr lvl="1">
-              <a:lnSpc>
-                <a:spcPct val="100000"/>
-              </a:lnSpc>
-              <a:spcBef>
-                <a:spcPts val="0"/>
-              </a:spcBef>
-              <a:spcAft>
-                <a:spcPts val="1000"/>
-              </a:spcAft>
-            </a:pPr>
-            <a:r>
-              <a:rPr lang="en-US" sz="2200" dirty="0"/>
-              <a:t>Pledge-responder-mode (use case 2): Pledge acts as server and communicates with registrar via a registrar-agent. Pledge is triggered (pushed) to generate and receive bootstrapping data. </a:t>
-            </a:r>
-            <a:r>
-              <a:rPr lang="en-US" sz="2200" dirty="0">
-                <a:sym typeface="Wingdings" panose="05000000000000000000" pitchFamily="2" charset="2"/>
-              </a:rPr>
-              <a:t> main changes made this use case</a:t>
-            </a:r>
-            <a:endParaRPr lang="en-US" sz="2200" dirty="0"/>
-          </a:p>
-          <a:p>
-            <a:pPr>
-              <a:lnSpc>
-                <a:spcPct val="100000"/>
-              </a:lnSpc>
-              <a:spcBef>
-                <a:spcPts val="0"/>
-              </a:spcBef>
-              <a:spcAft>
-                <a:spcPts val="1000"/>
-              </a:spcAft>
-            </a:pPr>
-            <a:r>
-              <a:rPr lang="en-US" sz="2200" dirty="0"/>
-              <a:t>Draft addresses these issues by defining the call flow and objects to be exchanged. To be independent of the transport security authenticated self-contained objects (signature-wrapped objects) for the certificate enrolment to bind proof of possession and poof of identity to the exchanged objects (similar to existing voucher exchanges with pledge)</a:t>
             </a:r>
           </a:p>
         </p:txBody>
@@ -8666,7 +8557,7 @@
             <a:fld id="{8C792E63-5F21-4F54-A864-D84D9F273FCA}" type="datetimeFigureOut">
               <a:rPr lang="en-US" smtClean="0"/>
               <a:pPr/>
-              <a:t>11/2/2021</a:t>
+              <a:t>11/3/2021</a:t>
             </a:fld>
             <a:endParaRPr lang="en-US" dirty="0"/>
           </a:p>
@@ -8923,7 +8814,15 @@
             </a:pPr>
             <a:r>
               <a:rPr lang="en-US" sz="2200" dirty="0"/>
-              <a:t>Housekeeping, deleted open issue regarding YANG voucher-request in UC2 as voucher-request was enhanced with additional leaf.</a:t>
+              <a:t>Housekeeping, deleted open issue regarding YANG voucher-request in UC2 as </a:t>
+            </a:r>
+            <a:r>
+              <a:rPr lang="en-US" sz="2200" dirty="0" err="1"/>
+              <a:t>ietf</a:t>
+            </a:r>
+            <a:r>
+              <a:rPr lang="en-US" sz="2200" dirty="0"/>
+              <a:t>-voucher-request was enhanced with additional leaf.</a:t>
             </a:r>
           </a:p>
           <a:p>
@@ -8943,6 +8842,14 @@
                 <a:spcPct val="100000"/>
               </a:lnSpc>
             </a:pPr>
+            <a:endParaRPr lang="en-US" sz="2200" dirty="0"/>
+          </a:p>
+          <a:p>
+            <a:pPr>
+              <a:lnSpc>
+                <a:spcPct val="100000"/>
+              </a:lnSpc>
+            </a:pPr>
             <a:r>
               <a:rPr lang="en-US" sz="2200" dirty="0"/>
               <a:t>From version 03 </a:t>
@@ -8962,7 +8869,7 @@
             </a:pPr>
             <a:r>
               <a:rPr lang="en-US" sz="2200" dirty="0"/>
-              <a:t>Moved UC2 related parts defining the pledge in responder mode to BRSKI-PRM.  This required changes and adaptations in several sections including the YANG model (#19). </a:t>
+              <a:t>Moved UC2 related parts defining pledge in responder mode to BRSKI-PRM (#19). </a:t>
             </a:r>
           </a:p>
           <a:p>
@@ -9115,7 +9022,7 @@
             <a:fld id="{8C792E63-5F21-4F54-A864-D84D9F273FCA}" type="datetimeFigureOut">
               <a:rPr lang="en-US" smtClean="0"/>
               <a:pPr/>
-              <a:t>11/2/2021</a:t>
+              <a:t>11/3/2021</a:t>
             </a:fld>
             <a:endParaRPr lang="en-US"/>
           </a:p>
@@ -9572,7 +9479,7 @@
             <a:fld id="{8C792E63-5F21-4F54-A864-D84D9F273FCA}" type="datetimeFigureOut">
               <a:rPr lang="en-US" smtClean="0"/>
               <a:pPr/>
-              <a:t>11/2/2021</a:t>
+              <a:t>11/3/2021</a:t>
             </a:fld>
             <a:endParaRPr lang="en-US" dirty="0"/>
           </a:p>
@@ -9849,7 +9756,7 @@
             </a:pPr>
             <a:r>
               <a:rPr lang="en-US" sz="2200" dirty="0"/>
-              <a:t>Moved UC2 defining the pledge in responder mode from BRSKI-AE-03 to BRSKI-PRM-00. This required changes and adaptations in several sections to remove the description and references to UC1.</a:t>
+              <a:t>Moved UC2 defining pledge in responder mode from BRSKI-AE-03 to BRSKI-PRM-00. </a:t>
             </a:r>
           </a:p>
           <a:p>
@@ -9860,7 +9767,15 @@
             </a:pPr>
             <a:r>
               <a:rPr lang="en-US" sz="2200" dirty="0"/>
-              <a:t>Addressed feedback for voucher-request enhancements from YANG doctor early review in Section 6 as well as in the Security Considerations Section.</a:t>
+              <a:t>Yang doctor early review addressed (</a:t>
+            </a:r>
+            <a:r>
+              <a:rPr lang="en-US" sz="2200" dirty="0" err="1"/>
+              <a:t>ietf</a:t>
+            </a:r>
+            <a:r>
+              <a:rPr lang="en-US" sz="2200" dirty="0"/>
+              <a:t>-voucher-request enhancements (Section 6, Security Considerations Section).</a:t>
             </a:r>
           </a:p>
           <a:p>
@@ -9871,7 +9786,7 @@
             </a:pPr>
             <a:r>
               <a:rPr lang="en-US" sz="2200" dirty="0"/>
-              <a:t>Renamed </a:t>
+              <a:t>Aligned naming of </a:t>
             </a:r>
             <a:r>
               <a:rPr lang="en-US" sz="2200" dirty="0" err="1"/>
@@ -9879,23 +9794,7 @@
             </a:r>
             <a:r>
               <a:rPr lang="en-US" sz="2200" dirty="0"/>
-              <a:t>-async-voucher-request to </a:t>
-            </a:r>
-            <a:r>
-              <a:rPr lang="en-US" sz="2200" dirty="0" err="1"/>
-              <a:t>ietf</a:t>
-            </a:r>
-            <a:r>
-              <a:rPr lang="en-US" sz="2200" dirty="0"/>
-              <a:t>-voucher-request-</a:t>
-            </a:r>
-            <a:r>
-              <a:rPr lang="en-US" sz="2200" dirty="0" err="1"/>
-              <a:t>prm</a:t>
-            </a:r>
-            <a:r>
-              <a:rPr lang="en-US" sz="2200" dirty="0"/>
-              <a:t> in alignment with the new draft and to allow better listing of voucher related extensions; aligned with constraint voucher (#20)</a:t>
+              <a:t>-voucher-request-xxx with other ANIMA drafts (#20).</a:t>
             </a:r>
           </a:p>
           <a:p>
@@ -9922,15 +9821,7 @@
             </a:r>
             <a:r>
               <a:rPr lang="en-US" sz="2200" dirty="0"/>
-              <a:t> instead of </a:t>
-            </a:r>
-            <a:r>
-              <a:rPr lang="en-US" sz="2200" dirty="0" err="1"/>
-              <a:t>ietf</a:t>
-            </a:r>
-            <a:r>
-              <a:rPr lang="en-US" sz="2200" dirty="0"/>
-              <a:t>-voucher-request in voucher exchanges to utilize the enhanced voucher-request (enhanced with additional components).</a:t>
+              <a:t> in voucher exchanges (to use enhancements for agent-signed-data).</a:t>
             </a:r>
           </a:p>
           <a:p>
@@ -10080,7 +9971,7 @@
             <a:fld id="{8C792E63-5F21-4F54-A864-D84D9F273FCA}" type="datetimeFigureOut">
               <a:rPr lang="en-US" smtClean="0"/>
               <a:pPr/>
-              <a:t>11/2/2021</a:t>
+              <a:t>11/3/2021</a:t>
             </a:fld>
             <a:endParaRPr lang="en-US" dirty="0"/>
           </a:p>
@@ -10345,6 +10236,55 @@
             </a:r>
           </a:p>
           <a:p>
+            <a:pPr lvl="1">
+              <a:lnSpc>
+                <a:spcPct val="100000"/>
+              </a:lnSpc>
+            </a:pPr>
+            <a:r>
+              <a:rPr lang="en-US" sz="2200" dirty="0"/>
+              <a:t>Verification of usage of </a:t>
+            </a:r>
+            <a:r>
+              <a:rPr lang="en-US" sz="2200" dirty="0" err="1"/>
+              <a:t>ietf</a:t>
+            </a:r>
+            <a:r>
+              <a:rPr lang="en-US" sz="2200" dirty="0"/>
+              <a:t>-</a:t>
+            </a:r>
+            <a:r>
+              <a:rPr lang="en-US" sz="2200" dirty="0" err="1"/>
+              <a:t>ztp</a:t>
+            </a:r>
+            <a:r>
+              <a:rPr lang="en-US" sz="2200" dirty="0"/>
+              <a:t>-types to convey PKCS#10 in BRSKI-PRM enrollment request (#5)</a:t>
+            </a:r>
+          </a:p>
+          <a:p>
+            <a:pPr lvl="1">
+              <a:lnSpc>
+                <a:spcPct val="100000"/>
+              </a:lnSpc>
+            </a:pPr>
+            <a:r>
+              <a:rPr lang="en-US" sz="2200" dirty="0"/>
+              <a:t>Option to generate multiple CSRs (domain specific, application specific)</a:t>
+            </a:r>
+          </a:p>
+          <a:p>
+            <a:pPr lvl="1">
+              <a:lnSpc>
+                <a:spcPct val="100000"/>
+              </a:lnSpc>
+            </a:pPr>
+            <a:r>
+              <a:rPr lang="en-US" sz="2200" dirty="0"/>
+              <a:t>Signature on enrollment response object? Protection of additional data contained or identification of registrar providing the certificate (audit)</a:t>
+            </a:r>
+          </a:p>
+          <a:p>
             <a:pPr>
               <a:lnSpc>
                 <a:spcPct val="100000"/>
@@ -10365,6 +10305,24 @@
               <a:rPr lang="en-US" sz="2200" dirty="0"/>
               <a:t>WG review appreciated</a:t>
             </a:r>
+          </a:p>
+          <a:p>
+            <a:pPr>
+              <a:lnSpc>
+                <a:spcPct val="100000"/>
+              </a:lnSpc>
+            </a:pPr>
+            <a:r>
+              <a:rPr lang="en-US" sz="2200" dirty="0"/>
+              <a:t>PoC implementation ongoing </a:t>
+            </a:r>
+            <a:r>
+              <a:rPr lang="en-US" sz="2200" dirty="0">
+                <a:sym typeface="Wingdings" panose="05000000000000000000" pitchFamily="2" charset="2"/>
+              </a:rPr>
+              <a:t> Interest from others welcome for interop testing</a:t>
+            </a:r>
+            <a:endParaRPr lang="en-US" sz="2200" dirty="0"/>
           </a:p>
           <a:p>
             <a:pPr marL="0" indent="0">
@@ -10503,7 +10461,7 @@
             <a:fld id="{8C792E63-5F21-4F54-A864-D84D9F273FCA}" type="datetimeFigureOut">
               <a:rPr lang="en-US" smtClean="0"/>
               <a:pPr/>
-              <a:t>11/2/2021</a:t>
+              <a:t>11/3/2021</a:t>
             </a:fld>
             <a:endParaRPr lang="en-US" dirty="0"/>
           </a:p>
@@ -11061,7 +11019,7 @@
         </p:nvCxnSpPr>
         <p:spPr>
           <a:xfrm>
-            <a:off x="3051775" y="3289262"/>
+            <a:off x="3051775" y="3099792"/>
             <a:ext cx="2531356" cy="0"/>
           </a:xfrm>
           <a:prstGeom prst="straightConnector1">
@@ -11100,7 +11058,7 @@
         </p:nvSpPr>
         <p:spPr>
           <a:xfrm>
-            <a:off x="3018065" y="3103381"/>
+            <a:off x="3018065" y="2913911"/>
             <a:ext cx="2565066" cy="215444"/>
           </a:xfrm>
           <a:prstGeom prst="rect">
@@ -11173,7 +11131,7 @@
         </p:nvCxnSpPr>
         <p:spPr>
           <a:xfrm flipH="1">
-            <a:off x="3083054" y="4126929"/>
+            <a:off x="3083054" y="3937459"/>
             <a:ext cx="2500077" cy="0"/>
           </a:xfrm>
           <a:prstGeom prst="straightConnector1">
@@ -11212,7 +11170,7 @@
         </p:nvSpPr>
         <p:spPr>
           <a:xfrm>
-            <a:off x="5571577" y="2532662"/>
+            <a:off x="5571577" y="2343192"/>
             <a:ext cx="1823403" cy="584775"/>
           </a:xfrm>
           <a:prstGeom prst="rect">
@@ -11357,7 +11315,7 @@
         </p:nvCxnSpPr>
         <p:spPr>
           <a:xfrm>
-            <a:off x="5583131" y="3444219"/>
+            <a:off x="5583131" y="3254749"/>
             <a:ext cx="4590024" cy="0"/>
           </a:xfrm>
           <a:prstGeom prst="straightConnector1">
@@ -11396,7 +11354,7 @@
         </p:nvSpPr>
         <p:spPr>
           <a:xfrm>
-            <a:off x="6450321" y="3274158"/>
+            <a:off x="6450321" y="3084688"/>
             <a:ext cx="3073365" cy="215444"/>
           </a:xfrm>
           <a:prstGeom prst="rect">
@@ -11481,7 +11439,7 @@
         </p:nvSpPr>
         <p:spPr>
           <a:xfrm rot="16200000">
-            <a:off x="9682117" y="2678949"/>
+            <a:off x="9682118" y="2661699"/>
             <a:ext cx="1799893" cy="707886"/>
           </a:xfrm>
           <a:prstGeom prst="rect">
@@ -11671,7 +11629,7 @@
         </p:nvCxnSpPr>
         <p:spPr>
           <a:xfrm flipH="1">
-            <a:off x="5592259" y="4013938"/>
+            <a:off x="5592259" y="3824468"/>
             <a:ext cx="4580896" cy="0"/>
           </a:xfrm>
           <a:prstGeom prst="straightConnector1">
@@ -11710,7 +11668,7 @@
         </p:nvSpPr>
         <p:spPr>
           <a:xfrm>
-            <a:off x="6649604" y="3832998"/>
+            <a:off x="6649604" y="3643528"/>
             <a:ext cx="2133918" cy="215444"/>
           </a:xfrm>
           <a:prstGeom prst="rect">
@@ -11781,7 +11739,7 @@
         </p:nvSpPr>
         <p:spPr>
           <a:xfrm>
-            <a:off x="2977514" y="3950053"/>
+            <a:off x="2977514" y="3760583"/>
             <a:ext cx="2518940" cy="215444"/>
           </a:xfrm>
           <a:prstGeom prst="rect">
@@ -12071,7 +12029,7 @@
         </p:nvSpPr>
         <p:spPr>
           <a:xfrm>
-            <a:off x="4411225" y="5790223"/>
+            <a:off x="3053791" y="5691371"/>
             <a:ext cx="2565066" cy="215444"/>
           </a:xfrm>
           <a:prstGeom prst="rect">
@@ -12116,7 +12074,7 @@
         </p:nvCxnSpPr>
         <p:spPr>
           <a:xfrm>
-            <a:off x="2844847" y="5994023"/>
+            <a:off x="2844847" y="5895171"/>
             <a:ext cx="2726731" cy="0"/>
           </a:xfrm>
           <a:prstGeom prst="straightConnector1">
@@ -12239,7 +12197,7 @@
         </p:nvCxnSpPr>
         <p:spPr>
           <a:xfrm flipH="1">
-            <a:off x="2843035" y="5023104"/>
+            <a:off x="2843035" y="4924252"/>
             <a:ext cx="2728543" cy="0"/>
           </a:xfrm>
           <a:prstGeom prst="straightConnector1">
@@ -12278,7 +12236,7 @@
         </p:nvSpPr>
         <p:spPr>
           <a:xfrm>
-            <a:off x="4411225" y="6093821"/>
+            <a:off x="3053791" y="5994969"/>
             <a:ext cx="2565066" cy="215444"/>
           </a:xfrm>
           <a:prstGeom prst="rect">
@@ -12629,7 +12587,7 @@
         </p:blipFill>
         <p:spPr>
           <a:xfrm>
-            <a:off x="9753117" y="3735018"/>
+            <a:off x="9753117" y="3545548"/>
             <a:ext cx="285914" cy="596161"/>
           </a:xfrm>
           <a:prstGeom prst="rect">
@@ -12785,13 +12743,14 @@
         </p:nvCxnSpPr>
         <p:spPr>
           <a:xfrm>
-            <a:off x="5592259" y="5994023"/>
+            <a:off x="5592259" y="5895171"/>
             <a:ext cx="2337581" cy="0"/>
           </a:xfrm>
           <a:prstGeom prst="straightConnector1">
             <a:avLst/>
           </a:prstGeom>
           <a:ln>
+            <a:prstDash val="dash"/>
             <a:tailEnd type="triangle"/>
           </a:ln>
         </p:spPr>
@@ -12826,13 +12785,14 @@
         </p:nvCxnSpPr>
         <p:spPr>
           <a:xfrm flipH="1">
-            <a:off x="5592259" y="6283109"/>
+            <a:off x="5592259" y="6184257"/>
             <a:ext cx="2337581" cy="0"/>
           </a:xfrm>
           <a:prstGeom prst="straightConnector1">
             <a:avLst/>
           </a:prstGeom>
           <a:ln>
+            <a:prstDash val="dash"/>
             <a:tailEnd type="triangle"/>
           </a:ln>
         </p:spPr>
@@ -12867,7 +12827,7 @@
         </p:nvCxnSpPr>
         <p:spPr>
           <a:xfrm>
-            <a:off x="1813605" y="4557925"/>
+            <a:off x="1813605" y="4426121"/>
             <a:ext cx="8366760" cy="0"/>
           </a:xfrm>
           <a:prstGeom prst="line">
@@ -12908,7 +12868,7 @@
         </p:nvSpPr>
         <p:spPr>
           <a:xfrm>
-            <a:off x="193187" y="2905228"/>
+            <a:off x="193187" y="2715758"/>
             <a:ext cx="1592340" cy="461665"/>
           </a:xfrm>
           <a:prstGeom prst="rect">
@@ -13015,7 +12975,7 @@
         </p:nvSpPr>
         <p:spPr>
           <a:xfrm>
-            <a:off x="173002" y="4879046"/>
+            <a:off x="173002" y="4598958"/>
             <a:ext cx="1597784" cy="584775"/>
           </a:xfrm>
           <a:prstGeom prst="rect">
@@ -13099,7 +13059,7 @@
                 <a:latin typeface="Courier New" panose="02070309020205020404" pitchFamily="49" charset="0"/>
                 <a:cs typeface="Courier New" panose="02070309020205020404" pitchFamily="49" charset="0"/>
               </a:rPr>
-              <a:t>, (e.g. Lightweight-CMP</a:t>
+              <a:t>, (e.g. Lightweight-CMP)</a:t>
             </a:r>
             <a:endParaRPr lang="en-US" sz="800" dirty="0">
               <a:latin typeface="Courier New" panose="02070309020205020404" pitchFamily="49" charset="0"/>
@@ -13130,7 +13090,7 @@
         </p:blipFill>
         <p:spPr>
           <a:xfrm>
-            <a:off x="2747747" y="3825248"/>
+            <a:off x="2747747" y="3635778"/>
             <a:ext cx="285914" cy="596161"/>
           </a:xfrm>
           <a:prstGeom prst="rect">
@@ -13160,7 +13120,7 @@
         </p:blipFill>
         <p:spPr>
           <a:xfrm>
-            <a:off x="2342272" y="2681743"/>
+            <a:off x="2342272" y="2492273"/>
             <a:ext cx="694908" cy="702301"/>
           </a:xfrm>
           <a:prstGeom prst="rect">
@@ -13190,7 +13150,7 @@
         </p:blipFill>
         <p:spPr>
           <a:xfrm>
-            <a:off x="5886753" y="3101542"/>
+            <a:off x="5886753" y="2912072"/>
             <a:ext cx="791691" cy="761573"/>
           </a:xfrm>
           <a:prstGeom prst="rect">
@@ -13212,7 +13172,7 @@
         </p:nvSpPr>
         <p:spPr>
           <a:xfrm>
-            <a:off x="2861859" y="4624684"/>
+            <a:off x="2861859" y="4525832"/>
             <a:ext cx="2565066" cy="215444"/>
           </a:xfrm>
           <a:prstGeom prst="rect">
@@ -13241,6 +13201,27 @@
               </a:rPr>
               <a:t>certificates</a:t>
             </a:r>
+            <a:r>
+              <a:rPr lang="de-DE" sz="800" dirty="0">
+                <a:latin typeface="Courier New" panose="02070309020205020404" pitchFamily="49" charset="0"/>
+                <a:cs typeface="Courier New" panose="02070309020205020404" pitchFamily="49" charset="0"/>
+              </a:rPr>
+              <a:t> (</a:t>
+            </a:r>
+            <a:r>
+              <a:rPr lang="de-DE" sz="800" dirty="0" err="1">
+                <a:latin typeface="Courier New" panose="02070309020205020404" pitchFamily="49" charset="0"/>
+                <a:cs typeface="Courier New" panose="02070309020205020404" pitchFamily="49" charset="0"/>
+              </a:rPr>
+              <a:t>opt</a:t>
+            </a:r>
+            <a:r>
+              <a:rPr lang="de-DE" sz="800" dirty="0">
+                <a:latin typeface="Courier New" panose="02070309020205020404" pitchFamily="49" charset="0"/>
+                <a:cs typeface="Courier New" panose="02070309020205020404" pitchFamily="49" charset="0"/>
+              </a:rPr>
+              <a:t>.)</a:t>
+            </a:r>
             <a:endParaRPr lang="en-US" sz="800" dirty="0">
               <a:latin typeface="Courier New" panose="02070309020205020404" pitchFamily="49" charset="0"/>
               <a:cs typeface="Courier New" panose="02070309020205020404" pitchFamily="49" charset="0"/>
@@ -13264,7 +13245,7 @@
         </p:nvCxnSpPr>
         <p:spPr>
           <a:xfrm>
-            <a:off x="2844847" y="4801628"/>
+            <a:off x="2844847" y="4702776"/>
             <a:ext cx="2726731" cy="0"/>
           </a:xfrm>
           <a:prstGeom prst="straightConnector1">
@@ -13303,7 +13284,7 @@
         </p:nvSpPr>
         <p:spPr>
           <a:xfrm>
-            <a:off x="2861859" y="4836535"/>
+            <a:off x="2861859" y="4737683"/>
             <a:ext cx="2565066" cy="215444"/>
           </a:xfrm>
           <a:prstGeom prst="rect">
@@ -13332,6 +13313,27 @@
               </a:rPr>
               <a:t>certificates</a:t>
             </a:r>
+            <a:r>
+              <a:rPr lang="de-DE" sz="800" dirty="0">
+                <a:latin typeface="Courier New" panose="02070309020205020404" pitchFamily="49" charset="0"/>
+                <a:cs typeface="Courier New" panose="02070309020205020404" pitchFamily="49" charset="0"/>
+              </a:rPr>
+              <a:t> (</a:t>
+            </a:r>
+            <a:r>
+              <a:rPr lang="de-DE" sz="800" dirty="0" err="1">
+                <a:latin typeface="Courier New" panose="02070309020205020404" pitchFamily="49" charset="0"/>
+                <a:cs typeface="Courier New" panose="02070309020205020404" pitchFamily="49" charset="0"/>
+              </a:rPr>
+              <a:t>opt</a:t>
+            </a:r>
+            <a:r>
+              <a:rPr lang="de-DE" sz="800" dirty="0">
+                <a:latin typeface="Courier New" panose="02070309020205020404" pitchFamily="49" charset="0"/>
+                <a:cs typeface="Courier New" panose="02070309020205020404" pitchFamily="49" charset="0"/>
+              </a:rPr>
+              <a:t>.)</a:t>
+            </a:r>
             <a:endParaRPr lang="en-US" sz="800" dirty="0">
               <a:latin typeface="Courier New" panose="02070309020205020404" pitchFamily="49" charset="0"/>
               <a:cs typeface="Courier New" panose="02070309020205020404" pitchFamily="49" charset="0"/>
@@ -13355,7 +13357,7 @@
         </p:nvCxnSpPr>
         <p:spPr>
           <a:xfrm flipH="1">
-            <a:off x="2843035" y="6298355"/>
+            <a:off x="2843035" y="6199503"/>
             <a:ext cx="2728543" cy="0"/>
           </a:xfrm>
           <a:prstGeom prst="straightConnector1">
@@ -13396,7 +13398,7 @@
         </p:nvCxnSpPr>
         <p:spPr>
           <a:xfrm flipH="1">
-            <a:off x="2843035" y="5523514"/>
+            <a:off x="2843035" y="5424662"/>
             <a:ext cx="2728543" cy="0"/>
           </a:xfrm>
           <a:prstGeom prst="straightConnector1">
@@ -13435,7 +13437,7 @@
         </p:nvSpPr>
         <p:spPr>
           <a:xfrm>
-            <a:off x="2861859" y="5125094"/>
+            <a:off x="2861859" y="5026242"/>
             <a:ext cx="2565066" cy="215444"/>
           </a:xfrm>
           <a:prstGeom prst="rect">
@@ -13478,6 +13480,27 @@
               </a:rPr>
               <a:t>attributes</a:t>
             </a:r>
+            <a:r>
+              <a:rPr lang="de-DE" sz="800" dirty="0">
+                <a:latin typeface="Courier New" panose="02070309020205020404" pitchFamily="49" charset="0"/>
+                <a:cs typeface="Courier New" panose="02070309020205020404" pitchFamily="49" charset="0"/>
+              </a:rPr>
+              <a:t> (</a:t>
+            </a:r>
+            <a:r>
+              <a:rPr lang="de-DE" sz="800" dirty="0" err="1">
+                <a:latin typeface="Courier New" panose="02070309020205020404" pitchFamily="49" charset="0"/>
+                <a:cs typeface="Courier New" panose="02070309020205020404" pitchFamily="49" charset="0"/>
+              </a:rPr>
+              <a:t>opt</a:t>
+            </a:r>
+            <a:r>
+              <a:rPr lang="de-DE" sz="800" dirty="0">
+                <a:latin typeface="Courier New" panose="02070309020205020404" pitchFamily="49" charset="0"/>
+                <a:cs typeface="Courier New" panose="02070309020205020404" pitchFamily="49" charset="0"/>
+              </a:rPr>
+              <a:t>.)</a:t>
+            </a:r>
             <a:endParaRPr lang="en-US" sz="800" dirty="0">
               <a:latin typeface="Courier New" panose="02070309020205020404" pitchFamily="49" charset="0"/>
               <a:cs typeface="Courier New" panose="02070309020205020404" pitchFamily="49" charset="0"/>
@@ -13501,7 +13524,7 @@
         </p:nvCxnSpPr>
         <p:spPr>
           <a:xfrm>
-            <a:off x="2844847" y="5302038"/>
+            <a:off x="2844847" y="5203186"/>
             <a:ext cx="2726731" cy="0"/>
           </a:xfrm>
           <a:prstGeom prst="straightConnector1">
@@ -13540,7 +13563,7 @@
         </p:nvSpPr>
         <p:spPr>
           <a:xfrm>
-            <a:off x="2861859" y="5336945"/>
+            <a:off x="2861859" y="5238093"/>
             <a:ext cx="2565066" cy="215444"/>
           </a:xfrm>
           <a:prstGeom prst="rect">
@@ -13575,6 +13598,27 @@
                 <a:cs typeface="Courier New" panose="02070309020205020404" pitchFamily="49" charset="0"/>
               </a:rPr>
               <a:t>attributes</a:t>
+            </a:r>
+            <a:r>
+              <a:rPr lang="de-DE" sz="800" dirty="0">
+                <a:latin typeface="Courier New" panose="02070309020205020404" pitchFamily="49" charset="0"/>
+                <a:cs typeface="Courier New" panose="02070309020205020404" pitchFamily="49" charset="0"/>
+              </a:rPr>
+              <a:t> (</a:t>
+            </a:r>
+            <a:r>
+              <a:rPr lang="de-DE" sz="800" dirty="0" err="1">
+                <a:latin typeface="Courier New" panose="02070309020205020404" pitchFamily="49" charset="0"/>
+                <a:cs typeface="Courier New" panose="02070309020205020404" pitchFamily="49" charset="0"/>
+              </a:rPr>
+              <a:t>opt</a:t>
+            </a:r>
+            <a:r>
+              <a:rPr lang="de-DE" sz="800" dirty="0">
+                <a:latin typeface="Courier New" panose="02070309020205020404" pitchFamily="49" charset="0"/>
+                <a:cs typeface="Courier New" panose="02070309020205020404" pitchFamily="49" charset="0"/>
+              </a:rPr>
+              <a:t>.)</a:t>
             </a:r>
             <a:endParaRPr lang="en-US" sz="800" dirty="0">
               <a:latin typeface="Courier New" panose="02070309020205020404" pitchFamily="49" charset="0"/>
@@ -13605,7 +13649,7 @@
         </p:blipFill>
         <p:spPr>
           <a:xfrm>
-            <a:off x="2598425" y="5628481"/>
+            <a:off x="2474855" y="5529629"/>
             <a:ext cx="486503" cy="528642"/>
           </a:xfrm>
           <a:prstGeom prst="rect">
@@ -13627,7 +13671,7 @@
         </p:nvSpPr>
         <p:spPr>
           <a:xfrm>
-            <a:off x="2492510" y="6176627"/>
+            <a:off x="2492510" y="6077775"/>
             <a:ext cx="324870" cy="240292"/>
           </a:xfrm>
           <a:prstGeom prst="rect">
@@ -13698,7 +13742,7 @@
         </p:blipFill>
         <p:spPr>
           <a:xfrm>
-            <a:off x="2492510" y="6137688"/>
+            <a:off x="2492510" y="6038836"/>
             <a:ext cx="310415" cy="310415"/>
           </a:xfrm>
           <a:prstGeom prst="rect">
@@ -13737,7 +13781,7 @@
         </p:blipFill>
         <p:spPr>
           <a:xfrm>
-            <a:off x="7978134" y="5850459"/>
+            <a:off x="7978134" y="6040934"/>
             <a:ext cx="310415" cy="310415"/>
           </a:xfrm>
           <a:prstGeom prst="rect">
@@ -13745,6 +13789,349 @@
           </a:prstGeom>
         </p:spPr>
       </p:pic>
+      <p:sp>
+        <p:nvSpPr>
+          <p:cNvPr id="57" name="TextBox 56">
+            <a:extLst>
+              <a:ext uri="{FF2B5EF4-FFF2-40B4-BE49-F238E27FC236}">
+                <a16:creationId xmlns:a16="http://schemas.microsoft.com/office/drawing/2014/main" id="{39CCD326-5567-4D6F-B40D-9B7506596483}"/>
+              </a:ext>
+            </a:extLst>
+          </p:cNvPr>
+          <p:cNvSpPr txBox="1"/>
+          <p:nvPr/>
+        </p:nvSpPr>
+        <p:spPr>
+          <a:xfrm>
+            <a:off x="1864060" y="6309844"/>
+            <a:ext cx="1041386" cy="338554"/>
+          </a:xfrm>
+          <a:prstGeom prst="rect">
+            <a:avLst/>
+          </a:prstGeom>
+          <a:noFill/>
+        </p:spPr>
+        <p:txBody>
+          <a:bodyPr wrap="square" rtlCol="0">
+            <a:spAutoFit/>
+          </a:bodyPr>
+          <a:lstStyle/>
+          <a:p>
+            <a:r>
+              <a:rPr lang="de-DE" sz="800" dirty="0" err="1">
+                <a:latin typeface="Courier New" panose="02070309020205020404" pitchFamily="49" charset="0"/>
+                <a:cs typeface="Courier New" panose="02070309020205020404" pitchFamily="49" charset="0"/>
+              </a:rPr>
+              <a:t>Verification</a:t>
+            </a:r>
+            <a:r>
+              <a:rPr lang="de-DE" sz="800" dirty="0">
+                <a:latin typeface="Courier New" panose="02070309020205020404" pitchFamily="49" charset="0"/>
+                <a:cs typeface="Courier New" panose="02070309020205020404" pitchFamily="49" charset="0"/>
+              </a:rPr>
+              <a:t> </a:t>
+            </a:r>
+            <a:r>
+              <a:rPr lang="de-DE" sz="800" dirty="0" err="1">
+                <a:latin typeface="Courier New" panose="02070309020205020404" pitchFamily="49" charset="0"/>
+                <a:cs typeface="Courier New" panose="02070309020205020404" pitchFamily="49" charset="0"/>
+              </a:rPr>
+              <a:t>of</a:t>
+            </a:r>
+            <a:r>
+              <a:rPr lang="de-DE" sz="800" dirty="0">
+                <a:latin typeface="Courier New" panose="02070309020205020404" pitchFamily="49" charset="0"/>
+                <a:cs typeface="Courier New" panose="02070309020205020404" pitchFamily="49" charset="0"/>
+              </a:rPr>
+              <a:t> </a:t>
+            </a:r>
+            <a:r>
+              <a:rPr lang="de-DE" sz="800" dirty="0" err="1">
+                <a:latin typeface="Courier New" panose="02070309020205020404" pitchFamily="49" charset="0"/>
+                <a:cs typeface="Courier New" panose="02070309020205020404" pitchFamily="49" charset="0"/>
+              </a:rPr>
+              <a:t>LDevID</a:t>
+            </a:r>
+            <a:r>
+              <a:rPr lang="de-DE" sz="800" dirty="0">
+                <a:latin typeface="Courier New" panose="02070309020205020404" pitchFamily="49" charset="0"/>
+                <a:cs typeface="Courier New" panose="02070309020205020404" pitchFamily="49" charset="0"/>
+              </a:rPr>
+              <a:t> </a:t>
+            </a:r>
+            <a:r>
+              <a:rPr lang="de-DE" sz="800" dirty="0" err="1">
+                <a:latin typeface="Courier New" panose="02070309020205020404" pitchFamily="49" charset="0"/>
+                <a:cs typeface="Courier New" panose="02070309020205020404" pitchFamily="49" charset="0"/>
+              </a:rPr>
+              <a:t>Cert</a:t>
+            </a:r>
+            <a:endParaRPr lang="de-DE" sz="800" dirty="0">
+              <a:latin typeface="Courier New" panose="02070309020205020404" pitchFamily="49" charset="0"/>
+              <a:cs typeface="Courier New" panose="02070309020205020404" pitchFamily="49" charset="0"/>
+            </a:endParaRPr>
+          </a:p>
+        </p:txBody>
+      </p:sp>
+      <p:sp>
+        <p:nvSpPr>
+          <p:cNvPr id="58" name="TextBox 57">
+            <a:extLst>
+              <a:ext uri="{FF2B5EF4-FFF2-40B4-BE49-F238E27FC236}">
+                <a16:creationId xmlns:a16="http://schemas.microsoft.com/office/drawing/2014/main" id="{57FF68A7-D687-4C1E-AD9D-97A88556CE39}"/>
+              </a:ext>
+            </a:extLst>
+          </p:cNvPr>
+          <p:cNvSpPr txBox="1"/>
+          <p:nvPr/>
+        </p:nvSpPr>
+        <p:spPr>
+          <a:xfrm>
+            <a:off x="5554428" y="5535815"/>
+            <a:ext cx="1041386" cy="338554"/>
+          </a:xfrm>
+          <a:prstGeom prst="rect">
+            <a:avLst/>
+          </a:prstGeom>
+          <a:noFill/>
+        </p:spPr>
+        <p:txBody>
+          <a:bodyPr wrap="square" rtlCol="0">
+            <a:spAutoFit/>
+          </a:bodyPr>
+          <a:lstStyle/>
+          <a:p>
+            <a:r>
+              <a:rPr lang="de-DE" sz="800" dirty="0" err="1">
+                <a:latin typeface="Courier New" panose="02070309020205020404" pitchFamily="49" charset="0"/>
+                <a:cs typeface="Courier New" panose="02070309020205020404" pitchFamily="49" charset="0"/>
+              </a:rPr>
+              <a:t>Verification</a:t>
+            </a:r>
+            <a:r>
+              <a:rPr lang="de-DE" sz="800" dirty="0">
+                <a:latin typeface="Courier New" panose="02070309020205020404" pitchFamily="49" charset="0"/>
+                <a:cs typeface="Courier New" panose="02070309020205020404" pitchFamily="49" charset="0"/>
+              </a:rPr>
+              <a:t> </a:t>
+            </a:r>
+            <a:r>
+              <a:rPr lang="de-DE" sz="800" dirty="0" err="1">
+                <a:latin typeface="Courier New" panose="02070309020205020404" pitchFamily="49" charset="0"/>
+                <a:cs typeface="Courier New" panose="02070309020205020404" pitchFamily="49" charset="0"/>
+              </a:rPr>
+              <a:t>of</a:t>
+            </a:r>
+            <a:r>
+              <a:rPr lang="de-DE" sz="800" dirty="0">
+                <a:latin typeface="Courier New" panose="02070309020205020404" pitchFamily="49" charset="0"/>
+                <a:cs typeface="Courier New" panose="02070309020205020404" pitchFamily="49" charset="0"/>
+              </a:rPr>
+              <a:t> </a:t>
+            </a:r>
+            <a:r>
+              <a:rPr lang="de-DE" sz="800" dirty="0" err="1">
+                <a:latin typeface="Courier New" panose="02070309020205020404" pitchFamily="49" charset="0"/>
+                <a:cs typeface="Courier New" panose="02070309020205020404" pitchFamily="49" charset="0"/>
+              </a:rPr>
+              <a:t>IDevID</a:t>
+            </a:r>
+            <a:r>
+              <a:rPr lang="de-DE" sz="800" dirty="0">
+                <a:latin typeface="Courier New" panose="02070309020205020404" pitchFamily="49" charset="0"/>
+                <a:cs typeface="Courier New" panose="02070309020205020404" pitchFamily="49" charset="0"/>
+              </a:rPr>
+              <a:t> </a:t>
+            </a:r>
+            <a:r>
+              <a:rPr lang="de-DE" sz="800" dirty="0" err="1">
+                <a:latin typeface="Courier New" panose="02070309020205020404" pitchFamily="49" charset="0"/>
+                <a:cs typeface="Courier New" panose="02070309020205020404" pitchFamily="49" charset="0"/>
+              </a:rPr>
+              <a:t>Cert</a:t>
+            </a:r>
+            <a:endParaRPr lang="de-DE" sz="800" dirty="0">
+              <a:latin typeface="Courier New" panose="02070309020205020404" pitchFamily="49" charset="0"/>
+              <a:cs typeface="Courier New" panose="02070309020205020404" pitchFamily="49" charset="0"/>
+            </a:endParaRPr>
+          </a:p>
+        </p:txBody>
+      </p:sp>
+      <p:cxnSp>
+        <p:nvCxnSpPr>
+          <p:cNvPr id="61" name="Straight Arrow Connector 60">
+            <a:extLst>
+              <a:ext uri="{FF2B5EF4-FFF2-40B4-BE49-F238E27FC236}">
+                <a16:creationId xmlns:a16="http://schemas.microsoft.com/office/drawing/2014/main" id="{B340CB7F-4452-4F41-97EA-6D109052CDAE}"/>
+              </a:ext>
+            </a:extLst>
+          </p:cNvPr>
+          <p:cNvCxnSpPr>
+            <a:cxnSpLocks/>
+          </p:cNvCxnSpPr>
+          <p:nvPr/>
+        </p:nvCxnSpPr>
+        <p:spPr>
+          <a:xfrm>
+            <a:off x="2844847" y="4256637"/>
+            <a:ext cx="2717602" cy="0"/>
+          </a:xfrm>
+          <a:prstGeom prst="straightConnector1">
+            <a:avLst/>
+          </a:prstGeom>
+          <a:ln>
+            <a:tailEnd type="triangle"/>
+          </a:ln>
+        </p:spPr>
+        <p:style>
+          <a:lnRef idx="1">
+            <a:schemeClr val="accent1"/>
+          </a:lnRef>
+          <a:fillRef idx="0">
+            <a:schemeClr val="accent1"/>
+          </a:fillRef>
+          <a:effectRef idx="0">
+            <a:schemeClr val="accent1"/>
+          </a:effectRef>
+          <a:fontRef idx="minor">
+            <a:schemeClr val="tx1"/>
+          </a:fontRef>
+        </p:style>
+      </p:cxnSp>
+      <p:sp>
+        <p:nvSpPr>
+          <p:cNvPr id="63" name="TextBox 62">
+            <a:extLst>
+              <a:ext uri="{FF2B5EF4-FFF2-40B4-BE49-F238E27FC236}">
+                <a16:creationId xmlns:a16="http://schemas.microsoft.com/office/drawing/2014/main" id="{25D084EF-1D12-43A5-915E-1BB0229B19C4}"/>
+              </a:ext>
+            </a:extLst>
+          </p:cNvPr>
+          <p:cNvSpPr txBox="1"/>
+          <p:nvPr/>
+        </p:nvSpPr>
+        <p:spPr>
+          <a:xfrm>
+            <a:off x="3493807" y="4073976"/>
+            <a:ext cx="1402866" cy="215444"/>
+          </a:xfrm>
+          <a:prstGeom prst="rect">
+            <a:avLst/>
+          </a:prstGeom>
+          <a:noFill/>
+        </p:spPr>
+        <p:txBody>
+          <a:bodyPr wrap="square" rtlCol="0">
+            <a:spAutoFit/>
+          </a:bodyPr>
+          <a:lstStyle/>
+          <a:p>
+            <a:pPr algn="ctr"/>
+            <a:r>
+              <a:rPr lang="de-DE" sz="800" dirty="0">
+                <a:latin typeface="Courier New" panose="02070309020205020404" pitchFamily="49" charset="0"/>
+                <a:cs typeface="Courier New" panose="02070309020205020404" pitchFamily="49" charset="0"/>
+              </a:rPr>
+              <a:t>Voucher-status</a:t>
+            </a:r>
+            <a:endParaRPr lang="en-US" sz="800" dirty="0">
+              <a:latin typeface="Courier New" panose="02070309020205020404" pitchFamily="49" charset="0"/>
+              <a:cs typeface="Courier New" panose="02070309020205020404" pitchFamily="49" charset="0"/>
+            </a:endParaRPr>
+          </a:p>
+        </p:txBody>
+      </p:sp>
+      <p:cxnSp>
+        <p:nvCxnSpPr>
+          <p:cNvPr id="64" name="Straight Arrow Connector 63">
+            <a:extLst>
+              <a:ext uri="{FF2B5EF4-FFF2-40B4-BE49-F238E27FC236}">
+                <a16:creationId xmlns:a16="http://schemas.microsoft.com/office/drawing/2014/main" id="{2003606E-088D-4101-9258-AF7AE3B4DEAB}"/>
+              </a:ext>
+            </a:extLst>
+          </p:cNvPr>
+          <p:cNvCxnSpPr>
+            <a:cxnSpLocks/>
+          </p:cNvCxnSpPr>
+          <p:nvPr/>
+        </p:nvCxnSpPr>
+        <p:spPr>
+          <a:xfrm>
+            <a:off x="2844847" y="6504319"/>
+            <a:ext cx="2717602" cy="0"/>
+          </a:xfrm>
+          <a:prstGeom prst="straightConnector1">
+            <a:avLst/>
+          </a:prstGeom>
+          <a:ln>
+            <a:tailEnd type="triangle"/>
+          </a:ln>
+        </p:spPr>
+        <p:style>
+          <a:lnRef idx="1">
+            <a:schemeClr val="accent1"/>
+          </a:lnRef>
+          <a:fillRef idx="0">
+            <a:schemeClr val="accent1"/>
+          </a:fillRef>
+          <a:effectRef idx="0">
+            <a:schemeClr val="accent1"/>
+          </a:effectRef>
+          <a:fontRef idx="minor">
+            <a:schemeClr val="tx1"/>
+          </a:fontRef>
+        </p:style>
+      </p:cxnSp>
+      <p:sp>
+        <p:nvSpPr>
+          <p:cNvPr id="65" name="TextBox 64">
+            <a:extLst>
+              <a:ext uri="{FF2B5EF4-FFF2-40B4-BE49-F238E27FC236}">
+                <a16:creationId xmlns:a16="http://schemas.microsoft.com/office/drawing/2014/main" id="{FCAC23AB-5544-4AC5-90E5-9495C6F76BDE}"/>
+              </a:ext>
+            </a:extLst>
+          </p:cNvPr>
+          <p:cNvSpPr txBox="1"/>
+          <p:nvPr/>
+        </p:nvSpPr>
+        <p:spPr>
+          <a:xfrm>
+            <a:off x="3493807" y="6321658"/>
+            <a:ext cx="1402866" cy="215444"/>
+          </a:xfrm>
+          <a:prstGeom prst="rect">
+            <a:avLst/>
+          </a:prstGeom>
+          <a:noFill/>
+        </p:spPr>
+        <p:txBody>
+          <a:bodyPr wrap="square" rtlCol="0">
+            <a:spAutoFit/>
+          </a:bodyPr>
+          <a:lstStyle/>
+          <a:p>
+            <a:pPr algn="ctr"/>
+            <a:r>
+              <a:rPr lang="de-DE" sz="800" dirty="0" err="1">
+                <a:latin typeface="Courier New" panose="02070309020205020404" pitchFamily="49" charset="0"/>
+                <a:cs typeface="Courier New" panose="02070309020205020404" pitchFamily="49" charset="0"/>
+              </a:rPr>
+              <a:t>Enrollment</a:t>
+            </a:r>
+            <a:r>
+              <a:rPr lang="de-DE" sz="800" dirty="0">
+                <a:latin typeface="Courier New" panose="02070309020205020404" pitchFamily="49" charset="0"/>
+                <a:cs typeface="Courier New" panose="02070309020205020404" pitchFamily="49" charset="0"/>
+              </a:rPr>
+              <a:t>-status</a:t>
+            </a:r>
+            <a:endParaRPr lang="en-US" sz="800" dirty="0">
+              <a:latin typeface="Courier New" panose="02070309020205020404" pitchFamily="49" charset="0"/>
+              <a:cs typeface="Courier New" panose="02070309020205020404" pitchFamily="49" charset="0"/>
+            </a:endParaRPr>
+          </a:p>
+        </p:txBody>
+      </p:sp>
     </p:spTree>
     <p:extLst>
       <p:ext uri="{BB962C8B-B14F-4D97-AF65-F5344CB8AC3E}">
@@ -16246,7 +16633,7 @@
         </p:nvSpPr>
         <p:spPr>
           <a:xfrm>
-            <a:off x="5072847" y="4672862"/>
+            <a:off x="3744676" y="4631672"/>
             <a:ext cx="2565066" cy="215444"/>
           </a:xfrm>
           <a:prstGeom prst="rect">
@@ -16305,7 +16692,7 @@
         </p:nvCxnSpPr>
         <p:spPr>
           <a:xfrm>
-            <a:off x="3739160" y="4876662"/>
+            <a:off x="3739160" y="4835472"/>
             <a:ext cx="2494040" cy="0"/>
           </a:xfrm>
           <a:prstGeom prst="straightConnector1">
@@ -16467,7 +16854,7 @@
         </p:nvSpPr>
         <p:spPr>
           <a:xfrm>
-            <a:off x="5072847" y="4880210"/>
+            <a:off x="3744676" y="4880210"/>
             <a:ext cx="2565066" cy="215444"/>
           </a:xfrm>
           <a:prstGeom prst="rect">
@@ -17155,13 +17542,14 @@
         </p:nvCxnSpPr>
         <p:spPr>
           <a:xfrm>
-            <a:off x="6253881" y="4876662"/>
+            <a:off x="6253881" y="4835472"/>
             <a:ext cx="2337581" cy="0"/>
           </a:xfrm>
           <a:prstGeom prst="straightConnector1">
             <a:avLst/>
           </a:prstGeom>
           <a:ln>
+            <a:prstDash val="dash"/>
             <a:tailEnd type="triangle"/>
           </a:ln>
         </p:spPr>
@@ -17203,6 +17591,7 @@
             <a:avLst/>
           </a:prstGeom>
           <a:ln>
+            <a:prstDash val="dash"/>
             <a:tailEnd type="triangle"/>
           </a:ln>
         </p:spPr>

</xml_diff>

<commit_message>
Updated Next steps, Slides will be uploaded to the data tracker for IETF 112
</commit_message>
<xml_diff>
--- a/presentations/slides-112-BRSKI-AE_BRSKI-PRM.pptx
+++ b/presentations/slides-112-BRSKI-AE_BRSKI-PRM.pptx
@@ -232,7 +232,7 @@
           <a:p>
             <a:fld id="{33B5B5E8-CA78-4A82-83A0-867EF5A818AE}" type="datetimeFigureOut">
               <a:rPr lang="en-US" smtClean="0"/>
-              <a:t>11/3/2021</a:t>
+              <a:t>11/4/2021</a:t>
             </a:fld>
             <a:endParaRPr lang="en-US"/>
           </a:p>
@@ -1410,7 +1410,7 @@
           <a:p>
             <a:fld id="{8C792E63-5F21-4F54-A864-D84D9F273FCA}" type="datetimeFigureOut">
               <a:rPr lang="en-US" smtClean="0"/>
-              <a:t>11/3/2021</a:t>
+              <a:t>11/4/2021</a:t>
             </a:fld>
             <a:endParaRPr lang="en-US" dirty="0"/>
           </a:p>
@@ -1628,7 +1628,7 @@
           <a:p>
             <a:fld id="{8C792E63-5F21-4F54-A864-D84D9F273FCA}" type="datetimeFigureOut">
               <a:rPr lang="en-US" smtClean="0"/>
-              <a:t>11/3/2021</a:t>
+              <a:t>11/4/2021</a:t>
             </a:fld>
             <a:endParaRPr lang="en-US"/>
           </a:p>
@@ -1852,7 +1852,7 @@
           <a:p>
             <a:fld id="{8C792E63-5F21-4F54-A864-D84D9F273FCA}" type="datetimeFigureOut">
               <a:rPr lang="en-US" smtClean="0"/>
-              <a:t>11/3/2021</a:t>
+              <a:t>11/4/2021</a:t>
             </a:fld>
             <a:endParaRPr lang="en-US"/>
           </a:p>
@@ -2066,7 +2066,7 @@
           <a:p>
             <a:fld id="{8C792E63-5F21-4F54-A864-D84D9F273FCA}" type="datetimeFigureOut">
               <a:rPr lang="en-US" smtClean="0"/>
-              <a:t>11/3/2021</a:t>
+              <a:t>11/4/2021</a:t>
             </a:fld>
             <a:endParaRPr lang="en-US"/>
           </a:p>
@@ -2357,7 +2357,7 @@
           <a:p>
             <a:fld id="{8C792E63-5F21-4F54-A864-D84D9F273FCA}" type="datetimeFigureOut">
               <a:rPr lang="en-US" smtClean="0"/>
-              <a:t>11/3/2021</a:t>
+              <a:t>11/4/2021</a:t>
             </a:fld>
             <a:endParaRPr lang="en-US"/>
           </a:p>
@@ -2638,7 +2638,7 @@
           <a:p>
             <a:fld id="{8C792E63-5F21-4F54-A864-D84D9F273FCA}" type="datetimeFigureOut">
               <a:rPr lang="en-US" smtClean="0"/>
-              <a:t>11/3/2021</a:t>
+              <a:t>11/4/2021</a:t>
             </a:fld>
             <a:endParaRPr lang="en-US"/>
           </a:p>
@@ -3066,7 +3066,7 @@
           <a:p>
             <a:fld id="{8C792E63-5F21-4F54-A864-D84D9F273FCA}" type="datetimeFigureOut">
               <a:rPr lang="en-US" smtClean="0"/>
-              <a:t>11/3/2021</a:t>
+              <a:t>11/4/2021</a:t>
             </a:fld>
             <a:endParaRPr lang="en-US"/>
           </a:p>
@@ -3223,7 +3223,7 @@
           <a:p>
             <a:fld id="{8C792E63-5F21-4F54-A864-D84D9F273FCA}" type="datetimeFigureOut">
               <a:rPr lang="en-US" smtClean="0"/>
-              <a:t>11/3/2021</a:t>
+              <a:t>11/4/2021</a:t>
             </a:fld>
             <a:endParaRPr lang="en-US"/>
           </a:p>
@@ -3352,7 +3352,7 @@
           <a:p>
             <a:fld id="{8C792E63-5F21-4F54-A864-D84D9F273FCA}" type="datetimeFigureOut">
               <a:rPr lang="en-US" smtClean="0"/>
-              <a:t>11/3/2021</a:t>
+              <a:t>11/4/2021</a:t>
             </a:fld>
             <a:endParaRPr lang="en-US"/>
           </a:p>
@@ -3679,7 +3679,7 @@
           <a:p>
             <a:fld id="{8C792E63-5F21-4F54-A864-D84D9F273FCA}" type="datetimeFigureOut">
               <a:rPr lang="en-US" smtClean="0"/>
-              <a:t>11/3/2021</a:t>
+              <a:t>11/4/2021</a:t>
             </a:fld>
             <a:endParaRPr lang="en-US"/>
           </a:p>
@@ -3983,7 +3983,7 @@
           <a:p>
             <a:fld id="{8C792E63-5F21-4F54-A864-D84D9F273FCA}" type="datetimeFigureOut">
               <a:rPr lang="en-US" smtClean="0"/>
-              <a:t>11/3/2021</a:t>
+              <a:t>11/4/2021</a:t>
             </a:fld>
             <a:endParaRPr lang="en-US"/>
           </a:p>
@@ -4275,7 +4275,7 @@
           <a:p>
             <a:fld id="{8C792E63-5F21-4F54-A864-D84D9F273FCA}" type="datetimeFigureOut">
               <a:rPr lang="en-US" smtClean="0"/>
-              <a:t>11/3/2021</a:t>
+              <a:t>11/4/2021</a:t>
             </a:fld>
             <a:endParaRPr lang="en-US"/>
           </a:p>
@@ -8557,7 +8557,7 @@
             <a:fld id="{8C792E63-5F21-4F54-A864-D84D9F273FCA}" type="datetimeFigureOut">
               <a:rPr lang="en-US" smtClean="0"/>
               <a:pPr/>
-              <a:t>11/3/2021</a:t>
+              <a:t>11/4/2021</a:t>
             </a:fld>
             <a:endParaRPr lang="en-US" dirty="0"/>
           </a:p>
@@ -9022,7 +9022,7 @@
             <a:fld id="{8C792E63-5F21-4F54-A864-D84D9F273FCA}" type="datetimeFigureOut">
               <a:rPr lang="en-US" smtClean="0"/>
               <a:pPr/>
-              <a:t>11/3/2021</a:t>
+              <a:t>11/4/2021</a:t>
             </a:fld>
             <a:endParaRPr lang="en-US"/>
           </a:p>
@@ -9330,16 +9330,27 @@
                 <a:spcPts val="600"/>
               </a:spcBef>
             </a:pPr>
+            <a:r>
+              <a:rPr lang="en-US" sz="2200" dirty="0"/>
+              <a:t>PoC implementation ongoing </a:t>
+            </a:r>
+            <a:r>
+              <a:rPr lang="en-US" sz="2200" dirty="0">
+                <a:sym typeface="Wingdings" panose="05000000000000000000" pitchFamily="2" charset="2"/>
+              </a:rPr>
+              <a:t> Interest from others welcome for interop testing</a:t>
+            </a:r>
             <a:endParaRPr lang="en-US" sz="2200" dirty="0"/>
           </a:p>
           <a:p>
-            <a:pPr lvl="1">
+            <a:pPr marL="457200" lvl="1" indent="0">
               <a:lnSpc>
                 <a:spcPct val="100000"/>
               </a:lnSpc>
               <a:spcBef>
                 <a:spcPts val="600"/>
               </a:spcBef>
+              <a:buNone/>
             </a:pPr>
             <a:endParaRPr lang="en-US" sz="1800" dirty="0"/>
           </a:p>
@@ -9479,7 +9490,7 @@
             <a:fld id="{8C792E63-5F21-4F54-A864-D84D9F273FCA}" type="datetimeFigureOut">
               <a:rPr lang="en-US" smtClean="0"/>
               <a:pPr/>
-              <a:t>11/3/2021</a:t>
+              <a:t>11/4/2021</a:t>
             </a:fld>
             <a:endParaRPr lang="en-US" dirty="0"/>
           </a:p>
@@ -9971,7 +9982,7 @@
             <a:fld id="{8C792E63-5F21-4F54-A864-D84D9F273FCA}" type="datetimeFigureOut">
               <a:rPr lang="en-US" smtClean="0"/>
               <a:pPr/>
-              <a:t>11/3/2021</a:t>
+              <a:t>11/4/2021</a:t>
             </a:fld>
             <a:endParaRPr lang="en-US" dirty="0"/>
           </a:p>
@@ -10270,7 +10281,7 @@
             </a:pPr>
             <a:r>
               <a:rPr lang="en-US" sz="2200" dirty="0"/>
-              <a:t>Option to generate multiple CSRs (domain specific, application specific)</a:t>
+              <a:t>Option to generate multiple CSRs (domain specific, application specific) (#7)</a:t>
             </a:r>
           </a:p>
           <a:p>
@@ -10281,7 +10292,7 @@
             </a:pPr>
             <a:r>
               <a:rPr lang="en-US" sz="2200" dirty="0"/>
-              <a:t>Signature on enrollment response object? Protection of additional data contained or identification of registrar providing the certificate (audit)</a:t>
+              <a:t>Signature on enrollment response object? Protection of additional data contained or identification of registrar providing the certificate (audit) (#8)</a:t>
             </a:r>
           </a:p>
           <a:p>
@@ -10461,7 +10472,7 @@
             <a:fld id="{8C792E63-5F21-4F54-A864-D84D9F273FCA}" type="datetimeFigureOut">
               <a:rPr lang="en-US" smtClean="0"/>
               <a:pPr/>
-              <a:t>11/3/2021</a:t>
+              <a:t>11/4/2021</a:t>
             </a:fld>
             <a:endParaRPr lang="en-US" dirty="0"/>
           </a:p>

</xml_diff>